<commit_message>
Updated 'Opportunities for Further Study' Slide
</commit_message>
<xml_diff>
--- a/Webscraping GoodRx.pptx
+++ b/Webscraping GoodRx.pptx
@@ -20,7 +20,7 @@
     <p:sldId id="369" r:id="rId11"/>
     <p:sldId id="370" r:id="rId12"/>
     <p:sldId id="371" r:id="rId13"/>
-    <p:sldId id="364" r:id="rId14"/>
+    <p:sldId id="374" r:id="rId14"/>
     <p:sldId id="343" r:id="rId15"/>
   </p:sldIdLst>
   <p:sldSz cx="12192000" cy="6858000"/>
@@ -366,7 +366,7 @@
           <a:p>
             <a:fld id="{6EE7A52F-9D89-7442-A8E9-48D1527B5F6B}" type="datetimeFigureOut">
               <a:rPr lang="en-US" smtClean="0"/>
-              <a:t>5/20/2021</a:t>
+              <a:t>5/21/2021</a:t>
             </a:fld>
             <a:endParaRPr lang="en-US" dirty="0"/>
           </a:p>
@@ -2028,7 +2028,7 @@
             <a:fld id="{6FCA8E82-58CD-E045-8B98-B7A85B79B752}" type="datetime4">
               <a:rPr lang="en-US" smtClean="0"/>
               <a:pPr/>
-              <a:t>May 20, 2021</a:t>
+              <a:t>May 21, 2021</a:t>
             </a:fld>
             <a:endParaRPr lang="en-US" dirty="0">
               <a:latin typeface="+mn-lt"/>
@@ -3158,7 +3158,7 @@
             <a:fld id="{6FCA8E82-58CD-E045-8B98-B7A85B79B752}" type="datetime4">
               <a:rPr lang="en-US" smtClean="0"/>
               <a:pPr/>
-              <a:t>May 20, 2021</a:t>
+              <a:t>May 21, 2021</a:t>
             </a:fld>
             <a:endParaRPr lang="en-US" dirty="0">
               <a:latin typeface="+mn-lt"/>
@@ -4287,7 +4287,7 @@
             <a:fld id="{6FCA8E82-58CD-E045-8B98-B7A85B79B752}" type="datetime4">
               <a:rPr lang="en-US" smtClean="0"/>
               <a:pPr/>
-              <a:t>May 20, 2021</a:t>
+              <a:t>May 21, 2021</a:t>
             </a:fld>
             <a:endParaRPr lang="en-US" dirty="0">
               <a:latin typeface="+mn-lt"/>
@@ -6585,7 +6585,7 @@
             <a:fld id="{6FCA8E82-58CD-E045-8B98-B7A85B79B752}" type="datetime4">
               <a:rPr lang="en-US" smtClean="0"/>
               <a:pPr/>
-              <a:t>May 20, 2021</a:t>
+              <a:t>May 21, 2021</a:t>
             </a:fld>
             <a:endParaRPr lang="en-US" dirty="0">
               <a:latin typeface="+mn-lt"/>
@@ -7220,7 +7220,7 @@
             <a:fld id="{6FCA8E82-58CD-E045-8B98-B7A85B79B752}" type="datetime4">
               <a:rPr lang="en-US" smtClean="0"/>
               <a:pPr/>
-              <a:t>May 20, 2021</a:t>
+              <a:t>May 21, 2021</a:t>
             </a:fld>
             <a:endParaRPr lang="en-US" dirty="0">
               <a:latin typeface="+mn-lt"/>
@@ -7990,7 +7990,7 @@
             <a:fld id="{6FCA8E82-58CD-E045-8B98-B7A85B79B752}" type="datetime4">
               <a:rPr lang="en-US" smtClean="0"/>
               <a:pPr/>
-              <a:t>May 20, 2021</a:t>
+              <a:t>May 21, 2021</a:t>
             </a:fld>
             <a:endParaRPr lang="en-US" dirty="0">
               <a:latin typeface="+mn-lt"/>
@@ -8254,7 +8254,7 @@
             <a:fld id="{6FCA8E82-58CD-E045-8B98-B7A85B79B752}" type="datetime4">
               <a:rPr lang="en-US" smtClean="0"/>
               <a:pPr/>
-              <a:t>May 20, 2021</a:t>
+              <a:t>May 21, 2021</a:t>
             </a:fld>
             <a:endParaRPr lang="en-US" dirty="0">
               <a:latin typeface="+mn-lt"/>
@@ -11177,7 +11177,7 @@
             <a:fld id="{6FCA8E82-58CD-E045-8B98-B7A85B79B752}" type="datetime4">
               <a:rPr lang="en-US" smtClean="0"/>
               <a:pPr/>
-              <a:t>May 20, 2021</a:t>
+              <a:t>May 21, 2021</a:t>
             </a:fld>
             <a:endParaRPr lang="en-US" dirty="0">
               <a:latin typeface="+mn-lt"/>
@@ -12352,7 +12352,7 @@
             <a:fld id="{6FCA8E82-58CD-E045-8B98-B7A85B79B752}" type="datetime4">
               <a:rPr lang="en-US" smtClean="0"/>
               <a:pPr/>
-              <a:t>May 20, 2021</a:t>
+              <a:t>May 21, 2021</a:t>
             </a:fld>
             <a:endParaRPr lang="en-US" dirty="0">
               <a:latin typeface="+mn-lt"/>
@@ -12668,7 +12668,7 @@
             <a:fld id="{6FCA8E82-58CD-E045-8B98-B7A85B79B752}" type="datetime4">
               <a:rPr lang="en-US" smtClean="0"/>
               <a:pPr/>
-              <a:t>May 20, 2021</a:t>
+              <a:t>May 21, 2021</a:t>
             </a:fld>
             <a:endParaRPr lang="en-US" dirty="0">
               <a:latin typeface="+mn-lt"/>
@@ -13370,7 +13370,7 @@
           <p:cNvPr id="2" name="Title 1">
             <a:extLst>
               <a:ext uri="{FF2B5EF4-FFF2-40B4-BE49-F238E27FC236}">
-                <a16:creationId xmlns:a16="http://schemas.microsoft.com/office/drawing/2014/main" id="{8C122DF8-59D4-D94D-8ED9-F2F319899DBF}"/>
+                <a16:creationId xmlns:a16="http://schemas.microsoft.com/office/drawing/2014/main" id="{D729292F-8E2B-43AA-B397-8CD805D1B68E}"/>
               </a:ext>
             </a:extLst>
           </p:cNvPr>
@@ -13384,7 +13384,7 @@
         <p:spPr>
           <a:xfrm>
             <a:off x="964023" y="879063"/>
-            <a:ext cx="7545663" cy="610863"/>
+            <a:ext cx="7696501" cy="610863"/>
           </a:xfrm>
         </p:spPr>
         <p:txBody>
@@ -13402,10 +13402,10 @@
       </p:sp>
       <p:sp>
         <p:nvSpPr>
-          <p:cNvPr id="45" name="Text Placeholder 44">
-            <a:extLst>
-              <a:ext uri="{FF2B5EF4-FFF2-40B4-BE49-F238E27FC236}">
-                <a16:creationId xmlns:a16="http://schemas.microsoft.com/office/drawing/2014/main" id="{803A1E73-C790-447A-974F-B3ADB50149F7}"/>
+          <p:cNvPr id="3" name="Text Placeholder 2">
+            <a:extLst>
+              <a:ext uri="{FF2B5EF4-FFF2-40B4-BE49-F238E27FC236}">
+                <a16:creationId xmlns:a16="http://schemas.microsoft.com/office/drawing/2014/main" id="{2A6F9A6E-C28A-4B30-B1BD-50EAAC5DEB99}"/>
               </a:ext>
             </a:extLst>
           </p:cNvPr>
@@ -13416,65 +13416,79 @@
             <p:ph type="body" sz="quarter" idx="12"/>
           </p:nvPr>
         </p:nvSpPr>
-        <p:spPr>
-          <a:xfrm>
-            <a:off x="952499" y="2286000"/>
-            <a:ext cx="5374159" cy="315915"/>
-          </a:xfrm>
-        </p:spPr>
+        <p:spPr/>
         <p:txBody>
           <a:bodyPr/>
           <a:lstStyle/>
           <a:p>
-            <a:r>
-              <a:rPr lang="en-US" sz="1600" dirty="0"/>
-              <a:t>Comparing data across different Rx Discount Programs</a:t>
-            </a:r>
-          </a:p>
-        </p:txBody>
-      </p:sp>
-      <p:sp>
-        <p:nvSpPr>
-          <p:cNvPr id="44" name="Text Placeholder 43">
-            <a:extLst>
-              <a:ext uri="{FF2B5EF4-FFF2-40B4-BE49-F238E27FC236}">
-                <a16:creationId xmlns:a16="http://schemas.microsoft.com/office/drawing/2014/main" id="{906E4DF9-127F-4650-8BAA-2521A37885B0}"/>
-              </a:ext>
-            </a:extLst>
-          </p:cNvPr>
-          <p:cNvSpPr>
-            <a:spLocks noGrp="1"/>
-          </p:cNvSpPr>
-          <p:nvPr>
-            <p:ph type="body" sz="quarter" idx="10"/>
-          </p:nvPr>
-        </p:nvSpPr>
-        <p:spPr/>
+            <a:endParaRPr lang="en-US"/>
+          </a:p>
+        </p:txBody>
+      </p:sp>
+      <p:sp>
+        <p:nvSpPr>
+          <p:cNvPr id="4" name="Text Placeholder 3">
+            <a:extLst>
+              <a:ext uri="{FF2B5EF4-FFF2-40B4-BE49-F238E27FC236}">
+                <a16:creationId xmlns:a16="http://schemas.microsoft.com/office/drawing/2014/main" id="{ED7711C8-D86D-4781-A224-D429A73AFF25}"/>
+              </a:ext>
+            </a:extLst>
+          </p:cNvPr>
+          <p:cNvSpPr>
+            <a:spLocks noGrp="1"/>
+          </p:cNvSpPr>
+          <p:nvPr>
+            <p:ph type="body" sz="quarter" idx="11"/>
+          </p:nvPr>
+        </p:nvSpPr>
+        <p:spPr>
+          <a:xfrm>
+            <a:off x="1296954" y="2587994"/>
+            <a:ext cx="4456904" cy="841005"/>
+          </a:xfrm>
+        </p:spPr>
         <p:txBody>
           <a:bodyPr/>
           <a:lstStyle/>
           <a:p>
             <a:r>
-              <a:rPr lang="en-US" dirty="0"/>
-              <a:t>xxx</a:t>
-            </a:r>
-          </a:p>
-        </p:txBody>
-      </p:sp>
-      <p:sp>
-        <p:nvSpPr>
-          <p:cNvPr id="47" name="Text Placeholder 46">
-            <a:extLst>
-              <a:ext uri="{FF2B5EF4-FFF2-40B4-BE49-F238E27FC236}">
-                <a16:creationId xmlns:a16="http://schemas.microsoft.com/office/drawing/2014/main" id="{DDA232CE-EB44-41DD-920C-AEDD5C33D2A5}"/>
-              </a:ext>
-            </a:extLst>
-          </p:cNvPr>
-          <p:cNvSpPr>
-            <a:spLocks noGrp="1"/>
-          </p:cNvSpPr>
-          <p:nvPr>
-            <p:ph type="body" sz="quarter" idx="14"/>
+              <a:rPr lang="en-US" sz="1800" dirty="0">
+                <a:solidFill>
+                  <a:schemeClr val="tx2"/>
+                </a:solidFill>
+              </a:rPr>
+              <a:t>Comparing data across different </a:t>
+            </a:r>
+          </a:p>
+          <a:p>
+            <a:r>
+              <a:rPr lang="en-US" sz="1800" dirty="0">
+                <a:solidFill>
+                  <a:schemeClr val="tx2"/>
+                </a:solidFill>
+              </a:rPr>
+              <a:t>Rx Discount Programs</a:t>
+            </a:r>
+          </a:p>
+          <a:p>
+            <a:endParaRPr lang="en-US" dirty="0"/>
+          </a:p>
+        </p:txBody>
+      </p:sp>
+      <p:sp>
+        <p:nvSpPr>
+          <p:cNvPr id="5" name="Text Placeholder 4">
+            <a:extLst>
+              <a:ext uri="{FF2B5EF4-FFF2-40B4-BE49-F238E27FC236}">
+                <a16:creationId xmlns:a16="http://schemas.microsoft.com/office/drawing/2014/main" id="{4FC337DF-33F0-4802-BDA9-1637C19DD046}"/>
+              </a:ext>
+            </a:extLst>
+          </p:cNvPr>
+          <p:cNvSpPr>
+            <a:spLocks noGrp="1"/>
+          </p:cNvSpPr>
+          <p:nvPr>
+            <p:ph type="body" sz="quarter" idx="30"/>
           </p:nvPr>
         </p:nvSpPr>
         <p:spPr/>
@@ -13482,60 +13496,87 @@
           <a:bodyPr/>
           <a:lstStyle/>
           <a:p>
-            <a:r>
-              <a:rPr lang="en-US" sz="1600" dirty="0"/>
-              <a:t>Comparing data across different categories of </a:t>
-            </a:r>
-            <a:r>
-              <a:rPr lang="en-US" sz="1600" dirty="0" err="1"/>
-              <a:t>Rxs</a:t>
-            </a:r>
-            <a:endParaRPr lang="en-US" sz="1600" dirty="0"/>
-          </a:p>
-        </p:txBody>
-      </p:sp>
-      <p:sp>
-        <p:nvSpPr>
-          <p:cNvPr id="46" name="Text Placeholder 45">
-            <a:extLst>
-              <a:ext uri="{FF2B5EF4-FFF2-40B4-BE49-F238E27FC236}">
-                <a16:creationId xmlns:a16="http://schemas.microsoft.com/office/drawing/2014/main" id="{A09D80D2-95FB-43C6-96F8-7EF7737C28BA}"/>
-              </a:ext>
-            </a:extLst>
-          </p:cNvPr>
-          <p:cNvSpPr>
-            <a:spLocks noGrp="1"/>
-          </p:cNvSpPr>
-          <p:nvPr>
-            <p:ph type="body" sz="quarter" idx="13"/>
-          </p:nvPr>
-        </p:nvSpPr>
-        <p:spPr/>
+            <a:endParaRPr lang="en-US"/>
+          </a:p>
+        </p:txBody>
+      </p:sp>
+      <p:sp>
+        <p:nvSpPr>
+          <p:cNvPr id="6" name="Text Placeholder 5">
+            <a:extLst>
+              <a:ext uri="{FF2B5EF4-FFF2-40B4-BE49-F238E27FC236}">
+                <a16:creationId xmlns:a16="http://schemas.microsoft.com/office/drawing/2014/main" id="{8277A4FF-DCBE-4107-A483-7B091D2041B9}"/>
+              </a:ext>
+            </a:extLst>
+          </p:cNvPr>
+          <p:cNvSpPr>
+            <a:spLocks noGrp="1"/>
+          </p:cNvSpPr>
+          <p:nvPr>
+            <p:ph type="body" sz="quarter" idx="31"/>
+          </p:nvPr>
+        </p:nvSpPr>
+        <p:spPr>
+          <a:xfrm>
+            <a:off x="3897799" y="4701908"/>
+            <a:ext cx="4456904" cy="532244"/>
+          </a:xfrm>
+        </p:spPr>
         <p:txBody>
           <a:bodyPr/>
           <a:lstStyle/>
           <a:p>
             <a:r>
-              <a:rPr lang="en-US" dirty="0"/>
-              <a:t>xxx</a:t>
-            </a:r>
-          </a:p>
-        </p:txBody>
-      </p:sp>
-      <p:sp>
-        <p:nvSpPr>
-          <p:cNvPr id="49" name="Text Placeholder 48">
-            <a:extLst>
-              <a:ext uri="{FF2B5EF4-FFF2-40B4-BE49-F238E27FC236}">
-                <a16:creationId xmlns:a16="http://schemas.microsoft.com/office/drawing/2014/main" id="{ED796758-F31D-4250-A439-D6DE9523C88B}"/>
-              </a:ext>
-            </a:extLst>
-          </p:cNvPr>
-          <p:cNvSpPr>
-            <a:spLocks noGrp="1"/>
-          </p:cNvSpPr>
-          <p:nvPr>
-            <p:ph type="body" sz="quarter" idx="16"/>
+              <a:rPr lang="en-US" sz="1800" dirty="0">
+                <a:solidFill>
+                  <a:schemeClr val="tx2"/>
+                </a:solidFill>
+              </a:rPr>
+              <a:t>Comparing data across different </a:t>
+            </a:r>
+          </a:p>
+          <a:p>
+            <a:r>
+              <a:rPr lang="en-US" sz="1800" dirty="0">
+                <a:solidFill>
+                  <a:schemeClr val="tx2"/>
+                </a:solidFill>
+              </a:rPr>
+              <a:t>categories of </a:t>
+            </a:r>
+            <a:r>
+              <a:rPr lang="en-US" sz="1800" dirty="0" err="1">
+                <a:solidFill>
+                  <a:schemeClr val="tx2"/>
+                </a:solidFill>
+              </a:rPr>
+              <a:t>Rxs</a:t>
+            </a:r>
+            <a:endParaRPr lang="en-US" sz="1800" dirty="0">
+              <a:solidFill>
+                <a:schemeClr val="tx2"/>
+              </a:solidFill>
+            </a:endParaRPr>
+          </a:p>
+          <a:p>
+            <a:endParaRPr lang="en-US" dirty="0"/>
+          </a:p>
+        </p:txBody>
+      </p:sp>
+      <p:sp>
+        <p:nvSpPr>
+          <p:cNvPr id="7" name="Text Placeholder 6">
+            <a:extLst>
+              <a:ext uri="{FF2B5EF4-FFF2-40B4-BE49-F238E27FC236}">
+                <a16:creationId xmlns:a16="http://schemas.microsoft.com/office/drawing/2014/main" id="{8A0ACCB9-14F1-4386-8938-12B24891E004}"/>
+              </a:ext>
+            </a:extLst>
+          </p:cNvPr>
+          <p:cNvSpPr>
+            <a:spLocks noGrp="1"/>
+          </p:cNvSpPr>
+          <p:nvPr>
+            <p:ph type="body" sz="quarter" idx="32"/>
           </p:nvPr>
         </p:nvSpPr>
         <p:spPr/>
@@ -13543,33 +13584,30 @@
           <a:bodyPr/>
           <a:lstStyle/>
           <a:p>
-            <a:r>
-              <a:rPr lang="en-US" sz="1600" dirty="0"/>
-              <a:t>Comparing data of long-standing generic medications vs newly available as generic</a:t>
-            </a:r>
-          </a:p>
-        </p:txBody>
-      </p:sp>
-      <p:sp>
-        <p:nvSpPr>
-          <p:cNvPr id="48" name="Text Placeholder 47">
-            <a:extLst>
-              <a:ext uri="{FF2B5EF4-FFF2-40B4-BE49-F238E27FC236}">
-                <a16:creationId xmlns:a16="http://schemas.microsoft.com/office/drawing/2014/main" id="{CEBFC0C0-C506-47F0-AE21-8A46DB86644A}"/>
-              </a:ext>
-            </a:extLst>
-          </p:cNvPr>
-          <p:cNvSpPr>
-            <a:spLocks noGrp="1"/>
-          </p:cNvSpPr>
-          <p:nvPr>
-            <p:ph type="body" sz="quarter" idx="15"/>
-          </p:nvPr>
-        </p:nvSpPr>
-        <p:spPr>
-          <a:xfrm>
-            <a:off x="952500" y="5225288"/>
-            <a:ext cx="4838700" cy="770076"/>
+            <a:endParaRPr lang="en-US"/>
+          </a:p>
+        </p:txBody>
+      </p:sp>
+      <p:sp>
+        <p:nvSpPr>
+          <p:cNvPr id="8" name="Text Placeholder 7">
+            <a:extLst>
+              <a:ext uri="{FF2B5EF4-FFF2-40B4-BE49-F238E27FC236}">
+                <a16:creationId xmlns:a16="http://schemas.microsoft.com/office/drawing/2014/main" id="{EE499D78-56F6-4E59-8BB7-84F3F77934F8}"/>
+              </a:ext>
+            </a:extLst>
+          </p:cNvPr>
+          <p:cNvSpPr>
+            <a:spLocks noGrp="1"/>
+          </p:cNvSpPr>
+          <p:nvPr>
+            <p:ph type="body" sz="quarter" idx="33"/>
+          </p:nvPr>
+        </p:nvSpPr>
+        <p:spPr>
+          <a:xfrm>
+            <a:off x="9001711" y="4792716"/>
+            <a:ext cx="2133600" cy="294611"/>
           </a:xfrm>
         </p:spPr>
         <p:txBody>
@@ -13577,26 +13615,33 @@
           <a:lstStyle/>
           <a:p>
             <a:r>
-              <a:rPr lang="en-US" dirty="0"/>
-              <a:t>xxx</a:t>
-            </a:r>
-          </a:p>
-        </p:txBody>
-      </p:sp>
-      <p:sp>
-        <p:nvSpPr>
-          <p:cNvPr id="51" name="Text Placeholder 50">
-            <a:extLst>
-              <a:ext uri="{FF2B5EF4-FFF2-40B4-BE49-F238E27FC236}">
-                <a16:creationId xmlns:a16="http://schemas.microsoft.com/office/drawing/2014/main" id="{D582AC9C-B267-4C04-9E50-051DE433538C}"/>
-              </a:ext>
-            </a:extLst>
-          </p:cNvPr>
-          <p:cNvSpPr>
-            <a:spLocks noGrp="1"/>
-          </p:cNvSpPr>
-          <p:nvPr>
-            <p:ph type="body" sz="quarter" idx="18"/>
+              <a:rPr lang="en-US" sz="1800" dirty="0">
+                <a:solidFill>
+                  <a:schemeClr val="tx2"/>
+                </a:solidFill>
+              </a:rPr>
+              <a:t>Rx Pricing over time</a:t>
+            </a:r>
+          </a:p>
+          <a:p>
+            <a:endParaRPr lang="en-US" dirty="0"/>
+          </a:p>
+        </p:txBody>
+      </p:sp>
+      <p:sp>
+        <p:nvSpPr>
+          <p:cNvPr id="9" name="Text Placeholder 8">
+            <a:extLst>
+              <a:ext uri="{FF2B5EF4-FFF2-40B4-BE49-F238E27FC236}">
+                <a16:creationId xmlns:a16="http://schemas.microsoft.com/office/drawing/2014/main" id="{68674100-7B42-4C73-8E0D-3920F9BBC211}"/>
+              </a:ext>
+            </a:extLst>
+          </p:cNvPr>
+          <p:cNvSpPr>
+            <a:spLocks noGrp="1"/>
+          </p:cNvSpPr>
+          <p:nvPr>
+            <p:ph type="body" sz="quarter" idx="34"/>
           </p:nvPr>
         </p:nvSpPr>
         <p:spPr/>
@@ -13604,55 +13649,64 @@
           <a:bodyPr/>
           <a:lstStyle/>
           <a:p>
-            <a:r>
-              <a:rPr lang="en-US" sz="1600" dirty="0"/>
-              <a:t>Rx Pricing over time</a:t>
-            </a:r>
-          </a:p>
-        </p:txBody>
-      </p:sp>
-      <p:sp>
-        <p:nvSpPr>
-          <p:cNvPr id="50" name="Text Placeholder 49">
-            <a:extLst>
-              <a:ext uri="{FF2B5EF4-FFF2-40B4-BE49-F238E27FC236}">
-                <a16:creationId xmlns:a16="http://schemas.microsoft.com/office/drawing/2014/main" id="{C60A09F8-DA84-487F-81AC-337BE4A9F35B}"/>
-              </a:ext>
-            </a:extLst>
-          </p:cNvPr>
-          <p:cNvSpPr>
-            <a:spLocks noGrp="1"/>
-          </p:cNvSpPr>
-          <p:nvPr>
-            <p:ph type="body" sz="quarter" idx="17"/>
-          </p:nvPr>
-        </p:nvSpPr>
-        <p:spPr/>
+            <a:endParaRPr lang="en-US"/>
+          </a:p>
+        </p:txBody>
+      </p:sp>
+      <p:sp>
+        <p:nvSpPr>
+          <p:cNvPr id="10" name="Text Placeholder 9">
+            <a:extLst>
+              <a:ext uri="{FF2B5EF4-FFF2-40B4-BE49-F238E27FC236}">
+                <a16:creationId xmlns:a16="http://schemas.microsoft.com/office/drawing/2014/main" id="{EF6DD009-C920-48E9-BE14-A69BEF44B9E8}"/>
+              </a:ext>
+            </a:extLst>
+          </p:cNvPr>
+          <p:cNvSpPr>
+            <a:spLocks noGrp="1"/>
+          </p:cNvSpPr>
+          <p:nvPr>
+            <p:ph type="body" sz="quarter" idx="35"/>
+          </p:nvPr>
+        </p:nvSpPr>
+        <p:spPr>
+          <a:xfrm>
+            <a:off x="6438143" y="2568686"/>
+            <a:ext cx="3557196" cy="610863"/>
+          </a:xfrm>
+        </p:spPr>
         <p:txBody>
           <a:bodyPr/>
           <a:lstStyle/>
           <a:p>
             <a:r>
-              <a:rPr lang="en-US" dirty="0"/>
-              <a:t>xxx</a:t>
-            </a:r>
-          </a:p>
-        </p:txBody>
-      </p:sp>
-      <p:sp>
-        <p:nvSpPr>
-          <p:cNvPr id="53" name="Text Placeholder 52">
-            <a:extLst>
-              <a:ext uri="{FF2B5EF4-FFF2-40B4-BE49-F238E27FC236}">
-                <a16:creationId xmlns:a16="http://schemas.microsoft.com/office/drawing/2014/main" id="{A1B673DD-4FEC-4191-8446-77B89805FF2B}"/>
-              </a:ext>
-            </a:extLst>
-          </p:cNvPr>
-          <p:cNvSpPr>
-            <a:spLocks noGrp="1"/>
-          </p:cNvSpPr>
-          <p:nvPr>
-            <p:ph type="body" sz="quarter" idx="20"/>
+              <a:rPr lang="en-US" sz="1800" dirty="0">
+                <a:solidFill>
+                  <a:schemeClr val="tx2"/>
+                </a:solidFill>
+              </a:rPr>
+              <a:t>Comparing data of long-standing generic medications vs newly available generic medications</a:t>
+            </a:r>
+          </a:p>
+          <a:p>
+            <a:endParaRPr lang="en-US" dirty="0"/>
+          </a:p>
+        </p:txBody>
+      </p:sp>
+      <p:sp>
+        <p:nvSpPr>
+          <p:cNvPr id="11" name="Date Placeholder 10">
+            <a:extLst>
+              <a:ext uri="{FF2B5EF4-FFF2-40B4-BE49-F238E27FC236}">
+                <a16:creationId xmlns:a16="http://schemas.microsoft.com/office/drawing/2014/main" id="{DA1596CD-165D-4AEC-A1A3-8E7A9E868C9B}"/>
+              </a:ext>
+            </a:extLst>
+          </p:cNvPr>
+          <p:cNvSpPr>
+            <a:spLocks noGrp="1"/>
+          </p:cNvSpPr>
+          <p:nvPr>
+            <p:ph type="dt" sz="half" idx="36"/>
           </p:nvPr>
         </p:nvSpPr>
         <p:spPr/>
@@ -13661,26 +13715,29 @@
           <a:lstStyle/>
           <a:p>
             <a:r>
-              <a:rPr lang="en-US" sz="1600" dirty="0"/>
-              <a:t>Trends in Self-Pay vs Insurance for Rx Medications</a:t>
-            </a:r>
-          </a:p>
-        </p:txBody>
-      </p:sp>
-      <p:sp>
-        <p:nvSpPr>
-          <p:cNvPr id="52" name="Text Placeholder 51">
-            <a:extLst>
-              <a:ext uri="{FF2B5EF4-FFF2-40B4-BE49-F238E27FC236}">
-                <a16:creationId xmlns:a16="http://schemas.microsoft.com/office/drawing/2014/main" id="{1E84004F-53E7-47E5-A493-1980475C42D4}"/>
-              </a:ext>
-            </a:extLst>
-          </p:cNvPr>
-          <p:cNvSpPr>
-            <a:spLocks noGrp="1"/>
-          </p:cNvSpPr>
-          <p:nvPr>
-            <p:ph type="body" sz="quarter" idx="19"/>
+              <a:rPr lang="en-US" dirty="0"/>
+              <a:t>   </a:t>
+            </a:r>
+            <a:endParaRPr lang="en-US" dirty="0">
+              <a:latin typeface="+mn-lt"/>
+            </a:endParaRPr>
+          </a:p>
+        </p:txBody>
+      </p:sp>
+      <p:sp>
+        <p:nvSpPr>
+          <p:cNvPr id="12" name="Footer Placeholder 11">
+            <a:extLst>
+              <a:ext uri="{FF2B5EF4-FFF2-40B4-BE49-F238E27FC236}">
+                <a16:creationId xmlns:a16="http://schemas.microsoft.com/office/drawing/2014/main" id="{C002B185-45C1-472C-A8CA-379421C830A5}"/>
+              </a:ext>
+            </a:extLst>
+          </p:cNvPr>
+          <p:cNvSpPr>
+            <a:spLocks noGrp="1"/>
+          </p:cNvSpPr>
+          <p:nvPr>
+            <p:ph type="ftr" sz="quarter" idx="37"/>
           </p:nvPr>
         </p:nvSpPr>
         <p:spPr/>
@@ -13690,33 +13747,29 @@
           <a:p>
             <a:r>
               <a:rPr lang="en-US" dirty="0"/>
-              <a:t>xxx</a:t>
-            </a:r>
-          </a:p>
-        </p:txBody>
-      </p:sp>
-      <p:sp>
-        <p:nvSpPr>
-          <p:cNvPr id="5" name="Slide Number Placeholder 4">
-            <a:extLst>
-              <a:ext uri="{FF2B5EF4-FFF2-40B4-BE49-F238E27FC236}">
-                <a16:creationId xmlns:a16="http://schemas.microsoft.com/office/drawing/2014/main" id="{AB744071-0CE2-7746-9315-22EC28A0F462}"/>
-              </a:ext>
-            </a:extLst>
-          </p:cNvPr>
-          <p:cNvSpPr>
-            <a:spLocks noGrp="1"/>
-          </p:cNvSpPr>
-          <p:nvPr>
-            <p:ph type="sldNum" sz="quarter" idx="23"/>
-          </p:nvPr>
-        </p:nvSpPr>
-        <p:spPr>
-          <a:xfrm>
-            <a:off x="971550" y="6332220"/>
-            <a:ext cx="523240" cy="247651"/>
-          </a:xfrm>
-        </p:spPr>
+              <a:t>  </a:t>
+            </a:r>
+            <a:endParaRPr lang="en-US" b="0" dirty="0"/>
+          </a:p>
+        </p:txBody>
+      </p:sp>
+      <p:sp>
+        <p:nvSpPr>
+          <p:cNvPr id="13" name="Slide Number Placeholder 12">
+            <a:extLst>
+              <a:ext uri="{FF2B5EF4-FFF2-40B4-BE49-F238E27FC236}">
+                <a16:creationId xmlns:a16="http://schemas.microsoft.com/office/drawing/2014/main" id="{CC8F2C7E-4254-4524-A8FF-CEEF4D5DA759}"/>
+              </a:ext>
+            </a:extLst>
+          </p:cNvPr>
+          <p:cNvSpPr>
+            <a:spLocks noGrp="1"/>
+          </p:cNvSpPr>
+          <p:nvPr>
+            <p:ph type="sldNum" sz="quarter" idx="38"/>
+          </p:nvPr>
+        </p:nvSpPr>
+        <p:spPr/>
         <p:txBody>
           <a:bodyPr/>
           <a:lstStyle/>
@@ -13726,80 +13779,16 @@
               <a:pPr/>
               <a:t>10</a:t>
             </a:fld>
-            <a:endParaRPr lang="en-US" dirty="0"/>
-          </a:p>
-        </p:txBody>
-      </p:sp>
-      <p:sp>
-        <p:nvSpPr>
-          <p:cNvPr id="4" name="Footer Placeholder 3">
-            <a:extLst>
-              <a:ext uri="{FF2B5EF4-FFF2-40B4-BE49-F238E27FC236}">
-                <a16:creationId xmlns:a16="http://schemas.microsoft.com/office/drawing/2014/main" id="{529E91F3-E1A0-DB4A-8CD8-D9D1AB0FFB40}"/>
-              </a:ext>
-            </a:extLst>
-          </p:cNvPr>
-          <p:cNvSpPr>
-            <a:spLocks noGrp="1"/>
-          </p:cNvSpPr>
-          <p:nvPr>
-            <p:ph type="ftr" sz="quarter" idx="22"/>
-          </p:nvPr>
-        </p:nvSpPr>
-        <p:spPr>
-          <a:xfrm>
-            <a:off x="1494790" y="6332220"/>
-            <a:ext cx="1497330" cy="247651"/>
-          </a:xfrm>
-        </p:spPr>
-        <p:txBody>
-          <a:bodyPr/>
-          <a:lstStyle/>
-          <a:p>
-            <a:r>
-              <a:rPr lang="en-US" dirty="0"/>
-              <a:t>   </a:t>
-            </a:r>
-          </a:p>
-        </p:txBody>
-      </p:sp>
-      <p:sp>
-        <p:nvSpPr>
-          <p:cNvPr id="3" name="Date Placeholder 2">
-            <a:extLst>
-              <a:ext uri="{FF2B5EF4-FFF2-40B4-BE49-F238E27FC236}">
-                <a16:creationId xmlns:a16="http://schemas.microsoft.com/office/drawing/2014/main" id="{4D5B7634-ADBA-124F-B8CA-431F07F18D44}"/>
-              </a:ext>
-            </a:extLst>
-          </p:cNvPr>
-          <p:cNvSpPr>
-            <a:spLocks noGrp="1"/>
-          </p:cNvSpPr>
-          <p:nvPr>
-            <p:ph type="dt" sz="half" idx="21"/>
-          </p:nvPr>
-        </p:nvSpPr>
-        <p:spPr>
-          <a:xfrm>
-            <a:off x="2992120" y="6332220"/>
-            <a:ext cx="1313180" cy="247651"/>
-          </a:xfrm>
-        </p:spPr>
-        <p:txBody>
-          <a:bodyPr/>
-          <a:lstStyle/>
-          <a:p>
-            <a:r>
-              <a:rPr lang="en-US" dirty="0"/>
-              <a:t>   </a:t>
-            </a:r>
+            <a:endParaRPr lang="en-US" dirty="0">
+              <a:latin typeface="+mn-lt"/>
+            </a:endParaRPr>
           </a:p>
         </p:txBody>
       </p:sp>
     </p:spTree>
     <p:extLst>
       <p:ext uri="{BB962C8B-B14F-4D97-AF65-F5344CB8AC3E}">
-        <p14:creationId xmlns:p14="http://schemas.microsoft.com/office/powerpoint/2010/main" val="643842168"/>
+        <p14:creationId xmlns:p14="http://schemas.microsoft.com/office/powerpoint/2010/main" val="3819502395"/>
       </p:ext>
     </p:extLst>
   </p:cSld>
@@ -13882,7 +13871,9 @@
           </a:xfrm>
         </p:spPr>
         <p:txBody>
-          <a:bodyPr/>
+          <a:bodyPr>
+            <a:normAutofit fontScale="92500" lnSpcReduction="10000"/>
+          </a:bodyPr>
           <a:lstStyle/>
           <a:p>
             <a:r>
@@ -13906,6 +13897,12 @@
           <a:p>
             <a:r>
               <a:rPr lang="en-US" dirty="0"/>
+              <a:t>LinkedIn:  https://www.linkedin.com/in/abartlettg/</a:t>
+            </a:r>
+          </a:p>
+          <a:p>
+            <a:r>
+              <a:rPr lang="en-US" dirty="0"/>
               <a:t>GitHub:  https://github.com/abartlettg/edrx</a:t>
             </a:r>
           </a:p>
@@ -13973,7 +13970,7 @@
         <p:spPr>
           <a:xfrm>
             <a:off x="5503905" y="5145831"/>
-            <a:ext cx="4914900" cy="627406"/>
+            <a:ext cx="4914900" cy="322647"/>
           </a:xfrm>
         </p:spPr>
         <p:txBody>
@@ -13987,12 +13984,6 @@
             <a:r>
               <a:rPr lang="en-US" dirty="0"/>
               <a:t>  </a:t>
-            </a:r>
-          </a:p>
-          <a:p>
-            <a:r>
-              <a:rPr lang="en-US" dirty="0"/>
-              <a:t>Spring 2021 Cohort</a:t>
             </a:r>
           </a:p>
         </p:txBody>
@@ -18802,24 +18793,6 @@
 </file>
 
 <file path=customXml/item1.xml><?xml version="1.0" encoding="utf-8"?>
-<p:properties xmlns:p="http://schemas.microsoft.com/office/2006/metadata/properties" xmlns:xsi="http://www.w3.org/2001/XMLSchema-instance" xmlns:pc="http://schemas.microsoft.com/office/infopath/2007/PartnerControls">
-  <documentManagement>
-    <Status xmlns="71af3243-3dd4-4a8d-8c0d-dd76da1f02a5">Not started</Status>
-    <MediaServiceKeyPoints xmlns="71af3243-3dd4-4a8d-8c0d-dd76da1f02a5" xsi:nil="true"/>
-  </documentManagement>
-</p:properties>
-</file>
-
-<file path=customXml/item2.xml><?xml version="1.0" encoding="utf-8"?>
-<?mso-contentType ?>
-<FormTemplates xmlns="http://schemas.microsoft.com/sharepoint/v3/contenttype/forms">
-  <Display>DocumentLibraryForm</Display>
-  <Edit>DocumentLibraryForm</Edit>
-  <New>DocumentLibraryForm</New>
-</FormTemplates>
-</file>
-
-<file path=customXml/item3.xml><?xml version="1.0" encoding="utf-8"?>
 <ct:contentTypeSchema xmlns:ct="http://schemas.microsoft.com/office/2006/metadata/contentType" xmlns:ma="http://schemas.microsoft.com/office/2006/metadata/properties/metaAttributes" ct:_="" ma:_="" ma:contentTypeName="Document" ma:contentTypeID="0x01010079F111ED35F8CC479449609E8A0923A6" ma:contentTypeVersion="12" ma:contentTypeDescription="Create a new document." ma:contentTypeScope="" ma:versionID="426e97fa315356fffbdcd9876fe988c2">
   <xsd:schema xmlns:xsd="http://www.w3.org/2001/XMLSchema" xmlns:xs="http://www.w3.org/2001/XMLSchema" xmlns:p="http://schemas.microsoft.com/office/2006/metadata/properties" xmlns:ns2="71af3243-3dd4-4a8d-8c0d-dd76da1f02a5" xmlns:ns3="16c05727-aa75-4e4a-9b5f-8a80a1165891" targetNamespace="http://schemas.microsoft.com/office/2006/metadata/properties" ma:root="true" ma:fieldsID="14b8f0def80e6d70ce3def20c90759ae" ns2:_="" ns3:_="">
     <xsd:import namespace="71af3243-3dd4-4a8d-8c0d-dd76da1f02a5"/>
@@ -19040,25 +19013,25 @@
 </ct:contentTypeSchema>
 </file>
 
-<file path=customXml/itemProps1.xml><?xml version="1.0" encoding="utf-8"?>
-<ds:datastoreItem xmlns:ds="http://schemas.openxmlformats.org/officeDocument/2006/customXml" ds:itemID="{09EC1AB0-9704-404D-B6D3-819D938AC55B}">
-  <ds:schemaRefs>
-    <ds:schemaRef ds:uri="http://schemas.microsoft.com/office/2006/metadata/properties"/>
-    <ds:schemaRef ds:uri="http://schemas.microsoft.com/office/infopath/2007/PartnerControls"/>
-    <ds:schemaRef ds:uri="71af3243-3dd4-4a8d-8c0d-dd76da1f02a5"/>
-  </ds:schemaRefs>
-</ds:datastoreItem>
+<file path=customXml/item2.xml><?xml version="1.0" encoding="utf-8"?>
+<?mso-contentType ?>
+<FormTemplates xmlns="http://schemas.microsoft.com/sharepoint/v3/contenttype/forms">
+  <Display>DocumentLibraryForm</Display>
+  <Edit>DocumentLibraryForm</Edit>
+  <New>DocumentLibraryForm</New>
+</FormTemplates>
 </file>
 
-<file path=customXml/itemProps2.xml><?xml version="1.0" encoding="utf-8"?>
-<ds:datastoreItem xmlns:ds="http://schemas.openxmlformats.org/officeDocument/2006/customXml" ds:itemID="{1D20B6E4-879E-4E6C-BDE7-261540CD3765}">
-  <ds:schemaRefs>
-    <ds:schemaRef ds:uri="http://schemas.microsoft.com/sharepoint/v3/contenttype/forms"/>
-  </ds:schemaRefs>
-</ds:datastoreItem>
+<file path=customXml/item3.xml><?xml version="1.0" encoding="utf-8"?>
+<p:properties xmlns:p="http://schemas.microsoft.com/office/2006/metadata/properties" xmlns:xsi="http://www.w3.org/2001/XMLSchema-instance" xmlns:pc="http://schemas.microsoft.com/office/infopath/2007/PartnerControls">
+  <documentManagement>
+    <Status xmlns="71af3243-3dd4-4a8d-8c0d-dd76da1f02a5">Not started</Status>
+    <MediaServiceKeyPoints xmlns="71af3243-3dd4-4a8d-8c0d-dd76da1f02a5" xsi:nil="true"/>
+  </documentManagement>
+</p:properties>
 </file>
 
-<file path=customXml/itemProps3.xml><?xml version="1.0" encoding="utf-8"?>
+<file path=customXml/itemProps1.xml><?xml version="1.0" encoding="utf-8"?>
 <ds:datastoreItem xmlns:ds="http://schemas.openxmlformats.org/officeDocument/2006/customXml" ds:itemID="{94F21D10-BD83-491A-AAA6-945C2DB1EB01}">
   <ds:schemaRefs>
     <ds:schemaRef ds:uri="http://schemas.microsoft.com/office/2006/metadata/contentType"/>
@@ -19075,4 +19048,22 @@
     <ds:schemaRef ds:uri="http://schemas.microsoft.com/internal/obd"/>
   </ds:schemaRefs>
 </ds:datastoreItem>
+</file>
+
+<file path=customXml/itemProps2.xml><?xml version="1.0" encoding="utf-8"?>
+<ds:datastoreItem xmlns:ds="http://schemas.openxmlformats.org/officeDocument/2006/customXml" ds:itemID="{1D20B6E4-879E-4E6C-BDE7-261540CD3765}">
+  <ds:schemaRefs>
+    <ds:schemaRef ds:uri="http://schemas.microsoft.com/sharepoint/v3/contenttype/forms"/>
+  </ds:schemaRefs>
+</ds:datastoreItem>
+</file>
+
+<file path=customXml/itemProps3.xml><?xml version="1.0" encoding="utf-8"?>
+<ds:datastoreItem xmlns:ds="http://schemas.openxmlformats.org/officeDocument/2006/customXml" ds:itemID="{09EC1AB0-9704-404D-B6D3-819D938AC55B}">
+  <ds:schemaRefs>
+    <ds:schemaRef ds:uri="http://schemas.microsoft.com/office/2006/metadata/properties"/>
+    <ds:schemaRef ds:uri="http://schemas.microsoft.com/office/infopath/2007/PartnerControls"/>
+    <ds:schemaRef ds:uri="71af3243-3dd4-4a8d-8c0d-dd76da1f02a5"/>
+  </ds:schemaRefs>
+</ds:datastoreItem>
 </file>
</xml_diff>